<commit_message>
Update documentation files and add fuel properties spec
Updated Codex task backlog and Dash Design presentation files. Added new FuelProperties_Spec (version 1).xlsx to the documentation.
</commit_message>
<xml_diff>
--- a/Docs/Dash Design.pptx
+++ b/Docs/Dash Design.pptx
@@ -5,7 +5,7 @@
     <p:sldMasterId id="2147483648" r:id="rId1"/>
   </p:sldMasterIdLst>
   <p:notesMasterIdLst>
-    <p:notesMasterId r:id="rId17"/>
+    <p:notesMasterId r:id="rId21"/>
   </p:notesMasterIdLst>
   <p:sldIdLst>
     <p:sldId id="286" r:id="rId2"/>
@@ -23,6 +23,10 @@
     <p:sldId id="280" r:id="rId14"/>
     <p:sldId id="295" r:id="rId15"/>
     <p:sldId id="297" r:id="rId16"/>
+    <p:sldId id="298" r:id="rId17"/>
+    <p:sldId id="299" r:id="rId18"/>
+    <p:sldId id="300" r:id="rId19"/>
+    <p:sldId id="301" r:id="rId20"/>
   </p:sldIdLst>
   <p:sldSz cx="12192000" cy="6858000"/>
   <p:notesSz cx="6858000" cy="9144000"/>
@@ -133,401 +137,6 @@
 <p188:authorLst xmlns:a="http://schemas.openxmlformats.org/drawingml/2006/main" xmlns:r="http://schemas.openxmlformats.org/officeDocument/2006/relationships" xmlns:p188="http://schemas.microsoft.com/office/powerpoint/2018/8/main">
   <p188:author id="{0395208A-B1A0-5A35-9D84-456F68CCFAA9}" name="Andy Larkman" initials="AL" userId="2da26f2e4321c6c2" providerId="Windows Live"/>
 </p188:authorLst>
-</file>
-
-<file path=ppt/changesInfos/changesInfo1.xml><?xml version="1.0" encoding="utf-8"?>
-<pc:chgInfo xmlns:a="http://schemas.openxmlformats.org/drawingml/2006/main" xmlns:r="http://schemas.openxmlformats.org/officeDocument/2006/relationships" xmlns:ac="http://schemas.microsoft.com/office/drawing/2013/main/command" xmlns:pc="http://schemas.microsoft.com/office/powerpoint/2013/main/command">
-  <pc:docChgLst>
-    <pc:chgData name="Andy Larkman" userId="2da26f2e4321c6c2" providerId="LiveId" clId="{011D6294-EEDB-4A63-B2E0-7A95F87567C2}"/>
-    <pc:docChg chg="modSld">
-      <pc:chgData name="Andy Larkman" userId="2da26f2e4321c6c2" providerId="LiveId" clId="{011D6294-EEDB-4A63-B2E0-7A95F87567C2}" dt="2025-09-12T10:38:10.098" v="1" actId="22"/>
-      <pc:docMkLst>
-        <pc:docMk/>
-      </pc:docMkLst>
-      <pc:sldChg chg="addSp mod">
-        <pc:chgData name="Andy Larkman" userId="2da26f2e4321c6c2" providerId="LiveId" clId="{011D6294-EEDB-4A63-B2E0-7A95F87567C2}" dt="2025-09-12T10:37:52.568" v="0" actId="22"/>
-        <pc:sldMkLst>
-          <pc:docMk/>
-          <pc:sldMk cId="1739857644" sldId="265"/>
-        </pc:sldMkLst>
-        <pc:picChg chg="add">
-          <ac:chgData name="Andy Larkman" userId="2da26f2e4321c6c2" providerId="LiveId" clId="{011D6294-EEDB-4A63-B2E0-7A95F87567C2}" dt="2025-09-12T10:37:52.568" v="0" actId="22"/>
-          <ac:picMkLst>
-            <pc:docMk/>
-            <pc:sldMk cId="1739857644" sldId="265"/>
-            <ac:picMk id="3" creationId="{8E17ABA5-EB81-1B76-65F5-5771C5359A11}"/>
-          </ac:picMkLst>
-        </pc:picChg>
-      </pc:sldChg>
-      <pc:sldChg chg="addSp mod">
-        <pc:chgData name="Andy Larkman" userId="2da26f2e4321c6c2" providerId="LiveId" clId="{011D6294-EEDB-4A63-B2E0-7A95F87567C2}" dt="2025-09-12T10:38:10.098" v="1" actId="22"/>
-        <pc:sldMkLst>
-          <pc:docMk/>
-          <pc:sldMk cId="4049805621" sldId="266"/>
-        </pc:sldMkLst>
-        <pc:picChg chg="add">
-          <ac:chgData name="Andy Larkman" userId="2da26f2e4321c6c2" providerId="LiveId" clId="{011D6294-EEDB-4A63-B2E0-7A95F87567C2}" dt="2025-09-12T10:38:10.098" v="1" actId="22"/>
-          <ac:picMkLst>
-            <pc:docMk/>
-            <pc:sldMk cId="4049805621" sldId="266"/>
-            <ac:picMk id="3" creationId="{FBC7FE6D-CDAB-1AF2-7FB2-5B1392861C3B}"/>
-          </ac:picMkLst>
-        </pc:picChg>
-      </pc:sldChg>
-    </pc:docChg>
-  </pc:docChgLst>
-  <pc:docChgLst>
-    <pc:chgData name="Andy Larkman" userId="2da26f2e4321c6c2" providerId="LiveId" clId="{B71A7C82-798A-48DC-9B06-FCEE167E4A24}"/>
-    <pc:docChg chg="custSel addSld delSld modSld sldOrd">
-      <pc:chgData name="Andy Larkman" userId="2da26f2e4321c6c2" providerId="LiveId" clId="{B71A7C82-798A-48DC-9B06-FCEE167E4A24}" dt="2025-08-21T21:57:39.428" v="64" actId="22"/>
-      <pc:docMkLst>
-        <pc:docMk/>
-      </pc:docMkLst>
-      <pc:sldChg chg="addSp mod">
-        <pc:chgData name="Andy Larkman" userId="2da26f2e4321c6c2" providerId="LiveId" clId="{B71A7C82-798A-48DC-9B06-FCEE167E4A24}" dt="2025-08-21T08:37:32.906" v="0" actId="22"/>
-        <pc:sldMkLst>
-          <pc:docMk/>
-          <pc:sldMk cId="556942426" sldId="260"/>
-        </pc:sldMkLst>
-        <pc:picChg chg="add">
-          <ac:chgData name="Andy Larkman" userId="2da26f2e4321c6c2" providerId="LiveId" clId="{B71A7C82-798A-48DC-9B06-FCEE167E4A24}" dt="2025-08-21T08:37:32.906" v="0" actId="22"/>
-          <ac:picMkLst>
-            <pc:docMk/>
-            <pc:sldMk cId="556942426" sldId="260"/>
-            <ac:picMk id="3" creationId="{CA1E03BC-08FE-31EA-5D4D-0E59C916A405}"/>
-          </ac:picMkLst>
-        </pc:picChg>
-      </pc:sldChg>
-      <pc:sldChg chg="addSp delSp modSp del mod">
-        <pc:chgData name="Andy Larkman" userId="2da26f2e4321c6c2" providerId="LiveId" clId="{B71A7C82-798A-48DC-9B06-FCEE167E4A24}" dt="2025-08-21T21:19:30.191" v="58" actId="47"/>
-        <pc:sldMkLst>
-          <pc:docMk/>
-          <pc:sldMk cId="1082248428" sldId="261"/>
-        </pc:sldMkLst>
-      </pc:sldChg>
-      <pc:sldChg chg="addSp mod">
-        <pc:chgData name="Andy Larkman" userId="2da26f2e4321c6c2" providerId="LiveId" clId="{B71A7C82-798A-48DC-9B06-FCEE167E4A24}" dt="2025-08-21T09:01:21.602" v="57" actId="22"/>
-        <pc:sldMkLst>
-          <pc:docMk/>
-          <pc:sldMk cId="4134498953" sldId="262"/>
-        </pc:sldMkLst>
-        <pc:picChg chg="add">
-          <ac:chgData name="Andy Larkman" userId="2da26f2e4321c6c2" providerId="LiveId" clId="{B71A7C82-798A-48DC-9B06-FCEE167E4A24}" dt="2025-08-21T09:01:21.602" v="57" actId="22"/>
-          <ac:picMkLst>
-            <pc:docMk/>
-            <pc:sldMk cId="4134498953" sldId="262"/>
-            <ac:picMk id="3" creationId="{5BD3CFED-F21A-6217-629A-69CD13B0D64D}"/>
-          </ac:picMkLst>
-        </pc:picChg>
-      </pc:sldChg>
-      <pc:sldChg chg="addSp modSp mod ord">
-        <pc:chgData name="Andy Larkman" userId="2da26f2e4321c6c2" providerId="LiveId" clId="{B71A7C82-798A-48DC-9B06-FCEE167E4A24}" dt="2025-08-21T21:20:17.855" v="63"/>
-        <pc:sldMkLst>
-          <pc:docMk/>
-          <pc:sldMk cId="1306477680" sldId="263"/>
-        </pc:sldMkLst>
-        <pc:picChg chg="add mod">
-          <ac:chgData name="Andy Larkman" userId="2da26f2e4321c6c2" providerId="LiveId" clId="{B71A7C82-798A-48DC-9B06-FCEE167E4A24}" dt="2025-08-21T21:20:15.083" v="61" actId="14100"/>
-          <ac:picMkLst>
-            <pc:docMk/>
-            <pc:sldMk cId="1306477680" sldId="263"/>
-            <ac:picMk id="3" creationId="{7B0EEBC9-9BD7-352B-9A2B-D455C9CDFA58}"/>
-          </ac:picMkLst>
-        </pc:picChg>
-      </pc:sldChg>
-      <pc:sldChg chg="addSp mod">
-        <pc:chgData name="Andy Larkman" userId="2da26f2e4321c6c2" providerId="LiveId" clId="{B71A7C82-798A-48DC-9B06-FCEE167E4A24}" dt="2025-08-21T21:57:39.428" v="64" actId="22"/>
-        <pc:sldMkLst>
-          <pc:docMk/>
-          <pc:sldMk cId="464445035" sldId="264"/>
-        </pc:sldMkLst>
-        <pc:picChg chg="add">
-          <ac:chgData name="Andy Larkman" userId="2da26f2e4321c6c2" providerId="LiveId" clId="{B71A7C82-798A-48DC-9B06-FCEE167E4A24}" dt="2025-08-21T21:57:39.428" v="64" actId="22"/>
-          <ac:picMkLst>
-            <pc:docMk/>
-            <pc:sldMk cId="464445035" sldId="264"/>
-            <ac:picMk id="3" creationId="{749D5594-346D-9DC9-929D-674AE3738D8D}"/>
-          </ac:picMkLst>
-        </pc:picChg>
-      </pc:sldChg>
-      <pc:sldChg chg="add del">
-        <pc:chgData name="Andy Larkman" userId="2da26f2e4321c6c2" providerId="LiveId" clId="{B71A7C82-798A-48DC-9B06-FCEE167E4A24}" dt="2025-08-21T09:01:18.606" v="56" actId="47"/>
-        <pc:sldMkLst>
-          <pc:docMk/>
-          <pc:sldMk cId="2706599228" sldId="282"/>
-        </pc:sldMkLst>
-      </pc:sldChg>
-    </pc:docChg>
-  </pc:docChgLst>
-  <pc:docChgLst>
-    <pc:chgData name="Andy Larkman" userId="2da26f2e4321c6c2" providerId="LiveId" clId="{AE5B54F1-C8F5-448A-ADA0-38ECB62D068A}"/>
-    <pc:docChg chg="addSld modSld">
-      <pc:chgData name="Andy Larkman" userId="2da26f2e4321c6c2" providerId="LiveId" clId="{AE5B54F1-C8F5-448A-ADA0-38ECB62D068A}" dt="2025-06-12T08:02:17.164" v="1" actId="22"/>
-      <pc:docMkLst>
-        <pc:docMk/>
-      </pc:docMkLst>
-      <pc:sldChg chg="addSp new mod">
-        <pc:chgData name="Andy Larkman" userId="2da26f2e4321c6c2" providerId="LiveId" clId="{AE5B54F1-C8F5-448A-ADA0-38ECB62D068A}" dt="2025-06-12T08:02:17.164" v="1" actId="22"/>
-        <pc:sldMkLst>
-          <pc:docMk/>
-          <pc:sldMk cId="2385937515" sldId="256"/>
-        </pc:sldMkLst>
-      </pc:sldChg>
-    </pc:docChg>
-  </pc:docChgLst>
-  <pc:docChgLst>
-    <pc:chgData name="Andy Larkman" userId="2da26f2e4321c6c2" providerId="LiveId" clId="{DD57E241-0078-4AE8-9E57-FF82578EE339}"/>
-    <pc:docChg chg="custSel addSld delSld modSld sldOrd">
-      <pc:chgData name="Andy Larkman" userId="2da26f2e4321c6c2" providerId="LiveId" clId="{DD57E241-0078-4AE8-9E57-FF82578EE339}" dt="2025-06-24T16:02:24.834" v="45" actId="22"/>
-      <pc:docMkLst>
-        <pc:docMk/>
-      </pc:docMkLst>
-      <pc:sldChg chg="addSp delSp new mod">
-        <pc:chgData name="Andy Larkman" userId="2da26f2e4321c6c2" providerId="LiveId" clId="{DD57E241-0078-4AE8-9E57-FF82578EE339}" dt="2025-06-24T07:06:25.636" v="43" actId="22"/>
-        <pc:sldMkLst>
-          <pc:docMk/>
-          <pc:sldMk cId="1990949740" sldId="256"/>
-        </pc:sldMkLst>
-      </pc:sldChg>
-      <pc:sldChg chg="del">
-        <pc:chgData name="Andy Larkman" userId="2da26f2e4321c6c2" providerId="LiveId" clId="{DD57E241-0078-4AE8-9E57-FF82578EE339}" dt="2025-06-12T16:04:43.852" v="0" actId="47"/>
-        <pc:sldMkLst>
-          <pc:docMk/>
-          <pc:sldMk cId="2385937515" sldId="256"/>
-        </pc:sldMkLst>
-      </pc:sldChg>
-      <pc:sldChg chg="addSp delSp add mod">
-        <pc:chgData name="Andy Larkman" userId="2da26f2e4321c6c2" providerId="LiveId" clId="{DD57E241-0078-4AE8-9E57-FF82578EE339}" dt="2025-06-24T07:06:45.322" v="44" actId="22"/>
-        <pc:sldMkLst>
-          <pc:docMk/>
-          <pc:sldMk cId="277392067" sldId="257"/>
-        </pc:sldMkLst>
-      </pc:sldChg>
-      <pc:sldChg chg="addSp delSp add mod">
-        <pc:chgData name="Andy Larkman" userId="2da26f2e4321c6c2" providerId="LiveId" clId="{DD57E241-0078-4AE8-9E57-FF82578EE339}" dt="2025-06-24T16:02:24.834" v="45" actId="22"/>
-        <pc:sldMkLst>
-          <pc:docMk/>
-          <pc:sldMk cId="3766907185" sldId="258"/>
-        </pc:sldMkLst>
-      </pc:sldChg>
-      <pc:sldChg chg="addSp modSp add mod">
-        <pc:chgData name="Andy Larkman" userId="2da26f2e4321c6c2" providerId="LiveId" clId="{DD57E241-0078-4AE8-9E57-FF82578EE339}" dt="2025-06-12T16:07:23.782" v="37" actId="14100"/>
-        <pc:sldMkLst>
-          <pc:docMk/>
-          <pc:sldMk cId="404469307" sldId="259"/>
-        </pc:sldMkLst>
-      </pc:sldChg>
-      <pc:sldChg chg="add">
-        <pc:chgData name="Andy Larkman" userId="2da26f2e4321c6c2" providerId="LiveId" clId="{DD57E241-0078-4AE8-9E57-FF82578EE339}" dt="2025-06-12T16:04:55.261" v="7"/>
-        <pc:sldMkLst>
-          <pc:docMk/>
-          <pc:sldMk cId="556942426" sldId="260"/>
-        </pc:sldMkLst>
-      </pc:sldChg>
-      <pc:sldChg chg="add">
-        <pc:chgData name="Andy Larkman" userId="2da26f2e4321c6c2" providerId="LiveId" clId="{DD57E241-0078-4AE8-9E57-FF82578EE339}" dt="2025-06-12T16:04:55.293" v="8"/>
-        <pc:sldMkLst>
-          <pc:docMk/>
-          <pc:sldMk cId="1082248428" sldId="261"/>
-        </pc:sldMkLst>
-      </pc:sldChg>
-      <pc:sldChg chg="add">
-        <pc:chgData name="Andy Larkman" userId="2da26f2e4321c6c2" providerId="LiveId" clId="{DD57E241-0078-4AE8-9E57-FF82578EE339}" dt="2025-06-12T16:04:55.326" v="9"/>
-        <pc:sldMkLst>
-          <pc:docMk/>
-          <pc:sldMk cId="4134498953" sldId="262"/>
-        </pc:sldMkLst>
-      </pc:sldChg>
-      <pc:sldChg chg="add">
-        <pc:chgData name="Andy Larkman" userId="2da26f2e4321c6c2" providerId="LiveId" clId="{DD57E241-0078-4AE8-9E57-FF82578EE339}" dt="2025-06-12T16:04:55.359" v="10"/>
-        <pc:sldMkLst>
-          <pc:docMk/>
-          <pc:sldMk cId="1306477680" sldId="263"/>
-        </pc:sldMkLst>
-      </pc:sldChg>
-      <pc:sldChg chg="add">
-        <pc:chgData name="Andy Larkman" userId="2da26f2e4321c6c2" providerId="LiveId" clId="{DD57E241-0078-4AE8-9E57-FF82578EE339}" dt="2025-06-12T16:04:55.387" v="11"/>
-        <pc:sldMkLst>
-          <pc:docMk/>
-          <pc:sldMk cId="464445035" sldId="264"/>
-        </pc:sldMkLst>
-      </pc:sldChg>
-      <pc:sldChg chg="add">
-        <pc:chgData name="Andy Larkman" userId="2da26f2e4321c6c2" providerId="LiveId" clId="{DD57E241-0078-4AE8-9E57-FF82578EE339}" dt="2025-06-12T16:04:55.415" v="12"/>
-        <pc:sldMkLst>
-          <pc:docMk/>
-          <pc:sldMk cId="1739857644" sldId="265"/>
-        </pc:sldMkLst>
-      </pc:sldChg>
-      <pc:sldChg chg="add">
-        <pc:chgData name="Andy Larkman" userId="2da26f2e4321c6c2" providerId="LiveId" clId="{DD57E241-0078-4AE8-9E57-FF82578EE339}" dt="2025-06-12T16:04:55.449" v="13"/>
-        <pc:sldMkLst>
-          <pc:docMk/>
-          <pc:sldMk cId="4049805621" sldId="266"/>
-        </pc:sldMkLst>
-      </pc:sldChg>
-      <pc:sldChg chg="add">
-        <pc:chgData name="Andy Larkman" userId="2da26f2e4321c6c2" providerId="LiveId" clId="{DD57E241-0078-4AE8-9E57-FF82578EE339}" dt="2025-06-12T16:04:55.478" v="14"/>
-        <pc:sldMkLst>
-          <pc:docMk/>
-          <pc:sldMk cId="570729223" sldId="267"/>
-        </pc:sldMkLst>
-      </pc:sldChg>
-      <pc:sldChg chg="add">
-        <pc:chgData name="Andy Larkman" userId="2da26f2e4321c6c2" providerId="LiveId" clId="{DD57E241-0078-4AE8-9E57-FF82578EE339}" dt="2025-06-12T16:04:55.507" v="15"/>
-        <pc:sldMkLst>
-          <pc:docMk/>
-          <pc:sldMk cId="3344888485" sldId="268"/>
-        </pc:sldMkLst>
-      </pc:sldChg>
-      <pc:sldChg chg="add">
-        <pc:chgData name="Andy Larkman" userId="2da26f2e4321c6c2" providerId="LiveId" clId="{DD57E241-0078-4AE8-9E57-FF82578EE339}" dt="2025-06-12T16:04:55.540" v="16"/>
-        <pc:sldMkLst>
-          <pc:docMk/>
-          <pc:sldMk cId="817053988" sldId="269"/>
-        </pc:sldMkLst>
-      </pc:sldChg>
-      <pc:sldChg chg="add">
-        <pc:chgData name="Andy Larkman" userId="2da26f2e4321c6c2" providerId="LiveId" clId="{DD57E241-0078-4AE8-9E57-FF82578EE339}" dt="2025-06-12T16:04:55.573" v="17"/>
-        <pc:sldMkLst>
-          <pc:docMk/>
-          <pc:sldMk cId="1248257113" sldId="270"/>
-        </pc:sldMkLst>
-      </pc:sldChg>
-      <pc:sldChg chg="add">
-        <pc:chgData name="Andy Larkman" userId="2da26f2e4321c6c2" providerId="LiveId" clId="{DD57E241-0078-4AE8-9E57-FF82578EE339}" dt="2025-06-12T16:04:55.599" v="18"/>
-        <pc:sldMkLst>
-          <pc:docMk/>
-          <pc:sldMk cId="721931620" sldId="271"/>
-        </pc:sldMkLst>
-      </pc:sldChg>
-      <pc:sldChg chg="add">
-        <pc:chgData name="Andy Larkman" userId="2da26f2e4321c6c2" providerId="LiveId" clId="{DD57E241-0078-4AE8-9E57-FF82578EE339}" dt="2025-06-12T16:04:55.634" v="19"/>
-        <pc:sldMkLst>
-          <pc:docMk/>
-          <pc:sldMk cId="1888056661" sldId="272"/>
-        </pc:sldMkLst>
-      </pc:sldChg>
-      <pc:sldChg chg="add">
-        <pc:chgData name="Andy Larkman" userId="2da26f2e4321c6c2" providerId="LiveId" clId="{DD57E241-0078-4AE8-9E57-FF82578EE339}" dt="2025-06-12T16:04:55.665" v="20"/>
-        <pc:sldMkLst>
-          <pc:docMk/>
-          <pc:sldMk cId="1796743994" sldId="273"/>
-        </pc:sldMkLst>
-      </pc:sldChg>
-      <pc:sldChg chg="add">
-        <pc:chgData name="Andy Larkman" userId="2da26f2e4321c6c2" providerId="LiveId" clId="{DD57E241-0078-4AE8-9E57-FF82578EE339}" dt="2025-06-12T16:04:55.694" v="21"/>
-        <pc:sldMkLst>
-          <pc:docMk/>
-          <pc:sldMk cId="3309312321" sldId="274"/>
-        </pc:sldMkLst>
-      </pc:sldChg>
-      <pc:sldChg chg="add">
-        <pc:chgData name="Andy Larkman" userId="2da26f2e4321c6c2" providerId="LiveId" clId="{DD57E241-0078-4AE8-9E57-FF82578EE339}" dt="2025-06-12T16:04:55.729" v="22"/>
-        <pc:sldMkLst>
-          <pc:docMk/>
-          <pc:sldMk cId="3636825823" sldId="275"/>
-        </pc:sldMkLst>
-      </pc:sldChg>
-      <pc:sldChg chg="add">
-        <pc:chgData name="Andy Larkman" userId="2da26f2e4321c6c2" providerId="LiveId" clId="{DD57E241-0078-4AE8-9E57-FF82578EE339}" dt="2025-06-12T16:04:55.757" v="23"/>
-        <pc:sldMkLst>
-          <pc:docMk/>
-          <pc:sldMk cId="1765660521" sldId="276"/>
-        </pc:sldMkLst>
-      </pc:sldChg>
-      <pc:sldChg chg="add">
-        <pc:chgData name="Andy Larkman" userId="2da26f2e4321c6c2" providerId="LiveId" clId="{DD57E241-0078-4AE8-9E57-FF82578EE339}" dt="2025-06-12T16:04:55.793" v="24"/>
-        <pc:sldMkLst>
-          <pc:docMk/>
-          <pc:sldMk cId="2506171242" sldId="277"/>
-        </pc:sldMkLst>
-      </pc:sldChg>
-      <pc:sldChg chg="add">
-        <pc:chgData name="Andy Larkman" userId="2da26f2e4321c6c2" providerId="LiveId" clId="{DD57E241-0078-4AE8-9E57-FF82578EE339}" dt="2025-06-12T16:04:55.817" v="25"/>
-        <pc:sldMkLst>
-          <pc:docMk/>
-          <pc:sldMk cId="2183014921" sldId="278"/>
-        </pc:sldMkLst>
-      </pc:sldChg>
-      <pc:sldChg chg="add">
-        <pc:chgData name="Andy Larkman" userId="2da26f2e4321c6c2" providerId="LiveId" clId="{DD57E241-0078-4AE8-9E57-FF82578EE339}" dt="2025-06-12T16:04:55.852" v="26"/>
-        <pc:sldMkLst>
-          <pc:docMk/>
-          <pc:sldMk cId="1654607364" sldId="279"/>
-        </pc:sldMkLst>
-      </pc:sldChg>
-      <pc:sldChg chg="add">
-        <pc:chgData name="Andy Larkman" userId="2da26f2e4321c6c2" providerId="LiveId" clId="{DD57E241-0078-4AE8-9E57-FF82578EE339}" dt="2025-06-12T16:04:55.880" v="27"/>
-        <pc:sldMkLst>
-          <pc:docMk/>
-          <pc:sldMk cId="1087879137" sldId="280"/>
-        </pc:sldMkLst>
-      </pc:sldChg>
-      <pc:sldChg chg="addSp delSp add mod ord">
-        <pc:chgData name="Andy Larkman" userId="2da26f2e4321c6c2" providerId="LiveId" clId="{DD57E241-0078-4AE8-9E57-FF82578EE339}" dt="2025-06-24T07:06:05.296" v="42" actId="22"/>
-        <pc:sldMkLst>
-          <pc:docMk/>
-          <pc:sldMk cId="3823361715" sldId="281"/>
-        </pc:sldMkLst>
-      </pc:sldChg>
-    </pc:docChg>
-  </pc:docChgLst>
-  <pc:docChgLst>
-    <pc:chgData name="Andy Larkman" userId="2da26f2e4321c6c2" providerId="LiveId" clId="{B504A635-07DA-4D69-9267-7A1876988564}"/>
-    <pc:docChg chg="modSld">
-      <pc:chgData name="Andy Larkman" userId="2da26f2e4321c6c2" providerId="LiveId" clId="{B504A635-07DA-4D69-9267-7A1876988564}" dt="2025-09-15T13:08:21.432" v="2" actId="22"/>
-      <pc:docMkLst>
-        <pc:docMk/>
-      </pc:docMkLst>
-      <pc:sldChg chg="addSp mod">
-        <pc:chgData name="Andy Larkman" userId="2da26f2e4321c6c2" providerId="LiveId" clId="{B504A635-07DA-4D69-9267-7A1876988564}" dt="2025-09-14T21:52:35.092" v="0" actId="22"/>
-        <pc:sldMkLst>
-          <pc:docMk/>
-          <pc:sldMk cId="570729223" sldId="267"/>
-        </pc:sldMkLst>
-        <pc:picChg chg="add">
-          <ac:chgData name="Andy Larkman" userId="2da26f2e4321c6c2" providerId="LiveId" clId="{B504A635-07DA-4D69-9267-7A1876988564}" dt="2025-09-14T21:52:35.092" v="0" actId="22"/>
-          <ac:picMkLst>
-            <pc:docMk/>
-            <pc:sldMk cId="570729223" sldId="267"/>
-            <ac:picMk id="3" creationId="{AA875420-386E-EEDB-2089-B828F78913D9}"/>
-          </ac:picMkLst>
-        </pc:picChg>
-      </pc:sldChg>
-      <pc:sldChg chg="addSp mod">
-        <pc:chgData name="Andy Larkman" userId="2da26f2e4321c6c2" providerId="LiveId" clId="{B504A635-07DA-4D69-9267-7A1876988564}" dt="2025-09-14T21:54:42.183" v="1" actId="22"/>
-        <pc:sldMkLst>
-          <pc:docMk/>
-          <pc:sldMk cId="3344888485" sldId="268"/>
-        </pc:sldMkLst>
-        <pc:picChg chg="add">
-          <ac:chgData name="Andy Larkman" userId="2da26f2e4321c6c2" providerId="LiveId" clId="{B504A635-07DA-4D69-9267-7A1876988564}" dt="2025-09-14T21:54:42.183" v="1" actId="22"/>
-          <ac:picMkLst>
-            <pc:docMk/>
-            <pc:sldMk cId="3344888485" sldId="268"/>
-            <ac:picMk id="3" creationId="{64C3F6AF-CD92-8BEC-7C92-B4C2726C7DC6}"/>
-          </ac:picMkLst>
-        </pc:picChg>
-      </pc:sldChg>
-      <pc:sldChg chg="addSp mod">
-        <pc:chgData name="Andy Larkman" userId="2da26f2e4321c6c2" providerId="LiveId" clId="{B504A635-07DA-4D69-9267-7A1876988564}" dt="2025-09-15T13:08:21.432" v="2" actId="22"/>
-        <pc:sldMkLst>
-          <pc:docMk/>
-          <pc:sldMk cId="817053988" sldId="269"/>
-        </pc:sldMkLst>
-        <pc:picChg chg="add">
-          <ac:chgData name="Andy Larkman" userId="2da26f2e4321c6c2" providerId="LiveId" clId="{B504A635-07DA-4D69-9267-7A1876988564}" dt="2025-09-15T13:08:21.432" v="2" actId="22"/>
-          <ac:picMkLst>
-            <pc:docMk/>
-            <pc:sldMk cId="817053988" sldId="269"/>
-            <ac:picMk id="3" creationId="{62709E59-5EC8-EAAD-CF94-B261DBD1D925}"/>
-          </ac:picMkLst>
-        </pc:picChg>
-      </pc:sldChg>
-    </pc:docChg>
-  </pc:docChgLst>
-</pc:chgInfo>
 </file>
 
 <file path=ppt/comments/modernComment_118_40D7B7E1.xml><?xml version="1.0" encoding="utf-8"?>
@@ -751,7 +360,7 @@
           <a:p>
             <a:fld id="{78E80721-A07A-4587-8DF4-4BBC5E50CA9B}" type="datetimeFigureOut">
               <a:rPr lang="en-GB" smtClean="0"/>
-              <a:t>13/12/2025</a:t>
+              <a:t>14/12/2025</a:t>
             </a:fld>
             <a:endParaRPr lang="en-GB"/>
           </a:p>
@@ -2200,7 +1809,7 @@
           <a:p>
             <a:fld id="{55FA135A-769C-438D-9AC0-5CFB87EA78F4}" type="datetimeFigureOut">
               <a:rPr lang="en-GB" smtClean="0"/>
-              <a:t>13/12/2025</a:t>
+              <a:t>14/12/2025</a:t>
             </a:fld>
             <a:endParaRPr lang="en-GB"/>
           </a:p>
@@ -2400,7 +2009,7 @@
           <a:p>
             <a:fld id="{55FA135A-769C-438D-9AC0-5CFB87EA78F4}" type="datetimeFigureOut">
               <a:rPr lang="en-GB" smtClean="0"/>
-              <a:t>13/12/2025</a:t>
+              <a:t>14/12/2025</a:t>
             </a:fld>
             <a:endParaRPr lang="en-GB"/>
           </a:p>
@@ -2610,7 +2219,7 @@
           <a:p>
             <a:fld id="{55FA135A-769C-438D-9AC0-5CFB87EA78F4}" type="datetimeFigureOut">
               <a:rPr lang="en-GB" smtClean="0"/>
-              <a:t>13/12/2025</a:t>
+              <a:t>14/12/2025</a:t>
             </a:fld>
             <a:endParaRPr lang="en-GB"/>
           </a:p>
@@ -2810,7 +2419,7 @@
           <a:p>
             <a:fld id="{55FA135A-769C-438D-9AC0-5CFB87EA78F4}" type="datetimeFigureOut">
               <a:rPr lang="en-GB" smtClean="0"/>
-              <a:t>13/12/2025</a:t>
+              <a:t>14/12/2025</a:t>
             </a:fld>
             <a:endParaRPr lang="en-GB"/>
           </a:p>
@@ -3086,7 +2695,7 @@
           <a:p>
             <a:fld id="{55FA135A-769C-438D-9AC0-5CFB87EA78F4}" type="datetimeFigureOut">
               <a:rPr lang="en-GB" smtClean="0"/>
-              <a:t>13/12/2025</a:t>
+              <a:t>14/12/2025</a:t>
             </a:fld>
             <a:endParaRPr lang="en-GB"/>
           </a:p>
@@ -3354,7 +2963,7 @@
           <a:p>
             <a:fld id="{55FA135A-769C-438D-9AC0-5CFB87EA78F4}" type="datetimeFigureOut">
               <a:rPr lang="en-GB" smtClean="0"/>
-              <a:t>13/12/2025</a:t>
+              <a:t>14/12/2025</a:t>
             </a:fld>
             <a:endParaRPr lang="en-GB"/>
           </a:p>
@@ -3769,7 +3378,7 @@
           <a:p>
             <a:fld id="{55FA135A-769C-438D-9AC0-5CFB87EA78F4}" type="datetimeFigureOut">
               <a:rPr lang="en-GB" smtClean="0"/>
-              <a:t>13/12/2025</a:t>
+              <a:t>14/12/2025</a:t>
             </a:fld>
             <a:endParaRPr lang="en-GB"/>
           </a:p>
@@ -3911,7 +3520,7 @@
           <a:p>
             <a:fld id="{55FA135A-769C-438D-9AC0-5CFB87EA78F4}" type="datetimeFigureOut">
               <a:rPr lang="en-GB" smtClean="0"/>
-              <a:t>13/12/2025</a:t>
+              <a:t>14/12/2025</a:t>
             </a:fld>
             <a:endParaRPr lang="en-GB"/>
           </a:p>
@@ -4024,7 +3633,7 @@
           <a:p>
             <a:fld id="{55FA135A-769C-438D-9AC0-5CFB87EA78F4}" type="datetimeFigureOut">
               <a:rPr lang="en-GB" smtClean="0"/>
-              <a:t>13/12/2025</a:t>
+              <a:t>14/12/2025</a:t>
             </a:fld>
             <a:endParaRPr lang="en-GB"/>
           </a:p>
@@ -4337,7 +3946,7 @@
           <a:p>
             <a:fld id="{55FA135A-769C-438D-9AC0-5CFB87EA78F4}" type="datetimeFigureOut">
               <a:rPr lang="en-GB" smtClean="0"/>
-              <a:t>13/12/2025</a:t>
+              <a:t>14/12/2025</a:t>
             </a:fld>
             <a:endParaRPr lang="en-GB"/>
           </a:p>
@@ -4626,7 +4235,7 @@
           <a:p>
             <a:fld id="{55FA135A-769C-438D-9AC0-5CFB87EA78F4}" type="datetimeFigureOut">
               <a:rPr lang="en-GB" smtClean="0"/>
-              <a:t>13/12/2025</a:t>
+              <a:t>14/12/2025</a:t>
             </a:fld>
             <a:endParaRPr lang="en-GB"/>
           </a:p>
@@ -4869,7 +4478,7 @@
           <a:p>
             <a:fld id="{55FA135A-769C-438D-9AC0-5CFB87EA78F4}" type="datetimeFigureOut">
               <a:rPr lang="en-GB" smtClean="0"/>
-              <a:t>13/12/2025</a:t>
+              <a:t>14/12/2025</a:t>
             </a:fld>
             <a:endParaRPr lang="en-GB"/>
           </a:p>
@@ -8790,6 +8399,344 @@
     <p:extLst>
       <p:ext uri="{BB962C8B-B14F-4D97-AF65-F5344CB8AC3E}">
         <p14:creationId xmlns:p14="http://schemas.microsoft.com/office/powerpoint/2010/main" val="1122932298"/>
+      </p:ext>
+    </p:extLst>
+  </p:cSld>
+  <p:clrMapOvr>
+    <a:masterClrMapping/>
+  </p:clrMapOvr>
+</p:sld>
+</file>
+
+<file path=ppt/slides/slide16.xml><?xml version="1.0" encoding="utf-8"?>
+<p:sld xmlns:a="http://schemas.openxmlformats.org/drawingml/2006/main" xmlns:r="http://schemas.openxmlformats.org/officeDocument/2006/relationships" xmlns:p="http://schemas.openxmlformats.org/presentationml/2006/main">
+  <p:cSld>
+    <p:spTree>
+      <p:nvGrpSpPr>
+        <p:cNvPr id="1" name=""/>
+        <p:cNvGrpSpPr/>
+        <p:nvPr/>
+      </p:nvGrpSpPr>
+      <p:grpSpPr>
+        <a:xfrm>
+          <a:off x="0" y="0"/>
+          <a:ext cx="0" cy="0"/>
+          <a:chOff x="0" y="0"/>
+          <a:chExt cx="0" cy="0"/>
+        </a:xfrm>
+      </p:grpSpPr>
+      <p:pic>
+        <p:nvPicPr>
+          <p:cNvPr id="5" name="Picture 4" descr="A screenshot of a computer&#10;&#10;AI-generated content may be incorrect.">
+            <a:extLst>
+              <a:ext uri="{FF2B5EF4-FFF2-40B4-BE49-F238E27FC236}">
+                <a16:creationId xmlns:a16="http://schemas.microsoft.com/office/drawing/2014/main" id="{FF28D9DD-CF0E-C497-6F80-969A36C29051}"/>
+              </a:ext>
+            </a:extLst>
+          </p:cNvPr>
+          <p:cNvPicPr>
+            <a:picLocks noChangeAspect="1"/>
+          </p:cNvPicPr>
+          <p:nvPr/>
+        </p:nvPicPr>
+        <p:blipFill>
+          <a:blip r:embed="rId2"/>
+          <a:stretch>
+            <a:fillRect/>
+          </a:stretch>
+        </p:blipFill>
+        <p:spPr>
+          <a:xfrm>
+            <a:off x="0" y="0"/>
+            <a:ext cx="5622859" cy="4814047"/>
+          </a:xfrm>
+          <a:prstGeom prst="rect">
+            <a:avLst/>
+          </a:prstGeom>
+          <a:ln>
+            <a:noFill/>
+          </a:ln>
+          <a:effectLst>
+            <a:outerShdw blurRad="292100" dist="139700" dir="2700000" algn="tl" rotWithShape="0">
+              <a:srgbClr val="333333">
+                <a:alpha val="65000"/>
+              </a:srgbClr>
+            </a:outerShdw>
+          </a:effectLst>
+        </p:spPr>
+      </p:pic>
+      <p:pic>
+        <p:nvPicPr>
+          <p:cNvPr id="7" name="Picture 6" descr="A screenshot of a computer program&#10;&#10;AI-generated content may be incorrect.">
+            <a:extLst>
+              <a:ext uri="{FF2B5EF4-FFF2-40B4-BE49-F238E27FC236}">
+                <a16:creationId xmlns:a16="http://schemas.microsoft.com/office/drawing/2014/main" id="{50B5999F-96AC-E963-E361-F84711A3D32C}"/>
+              </a:ext>
+            </a:extLst>
+          </p:cNvPr>
+          <p:cNvPicPr>
+            <a:picLocks noChangeAspect="1"/>
+          </p:cNvPicPr>
+          <p:nvPr/>
+        </p:nvPicPr>
+        <p:blipFill>
+          <a:blip r:embed="rId3"/>
+          <a:stretch>
+            <a:fillRect/>
+          </a:stretch>
+        </p:blipFill>
+        <p:spPr>
+          <a:xfrm>
+            <a:off x="5724485" y="0"/>
+            <a:ext cx="6346492" cy="4276165"/>
+          </a:xfrm>
+          <a:prstGeom prst="rect">
+            <a:avLst/>
+          </a:prstGeom>
+          <a:ln>
+            <a:noFill/>
+          </a:ln>
+          <a:effectLst>
+            <a:outerShdw blurRad="292100" dist="139700" dir="2700000" algn="tl" rotWithShape="0">
+              <a:srgbClr val="333333">
+                <a:alpha val="65000"/>
+              </a:srgbClr>
+            </a:outerShdw>
+          </a:effectLst>
+        </p:spPr>
+      </p:pic>
+    </p:spTree>
+    <p:extLst>
+      <p:ext uri="{BB962C8B-B14F-4D97-AF65-F5344CB8AC3E}">
+        <p14:creationId xmlns:p14="http://schemas.microsoft.com/office/powerpoint/2010/main" val="1245354489"/>
+      </p:ext>
+    </p:extLst>
+  </p:cSld>
+  <p:clrMapOvr>
+    <a:masterClrMapping/>
+  </p:clrMapOvr>
+</p:sld>
+</file>
+
+<file path=ppt/slides/slide17.xml><?xml version="1.0" encoding="utf-8"?>
+<p:sld xmlns:a="http://schemas.openxmlformats.org/drawingml/2006/main" xmlns:r="http://schemas.openxmlformats.org/officeDocument/2006/relationships" xmlns:p="http://schemas.openxmlformats.org/presentationml/2006/main">
+  <p:cSld>
+    <p:spTree>
+      <p:nvGrpSpPr>
+        <p:cNvPr id="1" name="">
+          <a:extLst>
+            <a:ext uri="{FF2B5EF4-FFF2-40B4-BE49-F238E27FC236}">
+              <a16:creationId xmlns:a16="http://schemas.microsoft.com/office/drawing/2014/main" id="{D5AEEF86-79D8-08A9-A74D-E468CB3A2EC3}"/>
+            </a:ext>
+          </a:extLst>
+        </p:cNvPr>
+        <p:cNvGrpSpPr/>
+        <p:nvPr/>
+      </p:nvGrpSpPr>
+      <p:grpSpPr>
+        <a:xfrm>
+          <a:off x="0" y="0"/>
+          <a:ext cx="0" cy="0"/>
+          <a:chOff x="0" y="0"/>
+          <a:chExt cx="0" cy="0"/>
+        </a:xfrm>
+      </p:grpSpPr>
+      <p:pic>
+        <p:nvPicPr>
+          <p:cNvPr id="3" name="Picture 2" descr="A screenshot of a computer screen&#10;&#10;AI-generated content may be incorrect.">
+            <a:extLst>
+              <a:ext uri="{FF2B5EF4-FFF2-40B4-BE49-F238E27FC236}">
+                <a16:creationId xmlns:a16="http://schemas.microsoft.com/office/drawing/2014/main" id="{1DEF8D9F-AD09-3860-87EB-4A1875D20919}"/>
+              </a:ext>
+            </a:extLst>
+          </p:cNvPr>
+          <p:cNvPicPr>
+            <a:picLocks noChangeAspect="1"/>
+          </p:cNvPicPr>
+          <p:nvPr/>
+        </p:nvPicPr>
+        <p:blipFill>
+          <a:blip r:embed="rId2"/>
+          <a:stretch>
+            <a:fillRect/>
+          </a:stretch>
+        </p:blipFill>
+        <p:spPr>
+          <a:xfrm>
+            <a:off x="0" y="112475"/>
+            <a:ext cx="6031841" cy="4472972"/>
+          </a:xfrm>
+          <a:prstGeom prst="rect">
+            <a:avLst/>
+          </a:prstGeom>
+          <a:ln>
+            <a:noFill/>
+          </a:ln>
+          <a:effectLst>
+            <a:outerShdw blurRad="292100" dist="139700" dir="2700000" algn="tl" rotWithShape="0">
+              <a:srgbClr val="333333">
+                <a:alpha val="65000"/>
+              </a:srgbClr>
+            </a:outerShdw>
+          </a:effectLst>
+        </p:spPr>
+      </p:pic>
+      <p:pic>
+        <p:nvPicPr>
+          <p:cNvPr id="6" name="Picture 5" descr="A white background with black text&#10;&#10;AI-generated content may be incorrect.">
+            <a:extLst>
+              <a:ext uri="{FF2B5EF4-FFF2-40B4-BE49-F238E27FC236}">
+                <a16:creationId xmlns:a16="http://schemas.microsoft.com/office/drawing/2014/main" id="{FF02D443-5CB0-9839-1974-F7ED2B4F801A}"/>
+              </a:ext>
+            </a:extLst>
+          </p:cNvPr>
+          <p:cNvPicPr>
+            <a:picLocks noChangeAspect="1"/>
+          </p:cNvPicPr>
+          <p:nvPr/>
+        </p:nvPicPr>
+        <p:blipFill>
+          <a:blip r:embed="rId3"/>
+          <a:stretch>
+            <a:fillRect/>
+          </a:stretch>
+        </p:blipFill>
+        <p:spPr>
+          <a:xfrm>
+            <a:off x="0" y="4738263"/>
+            <a:ext cx="6063834" cy="1877690"/>
+          </a:xfrm>
+          <a:prstGeom prst="rect">
+            <a:avLst/>
+          </a:prstGeom>
+          <a:ln>
+            <a:noFill/>
+          </a:ln>
+          <a:effectLst>
+            <a:outerShdw blurRad="292100" dist="139700" dir="2700000" algn="tl" rotWithShape="0">
+              <a:srgbClr val="333333">
+                <a:alpha val="65000"/>
+              </a:srgbClr>
+            </a:outerShdw>
+          </a:effectLst>
+        </p:spPr>
+      </p:pic>
+      <p:pic>
+        <p:nvPicPr>
+          <p:cNvPr id="8" name="Picture 7" descr="A screenshot of a computer program&#10;&#10;AI-generated content may be incorrect.">
+            <a:extLst>
+              <a:ext uri="{FF2B5EF4-FFF2-40B4-BE49-F238E27FC236}">
+                <a16:creationId xmlns:a16="http://schemas.microsoft.com/office/drawing/2014/main" id="{CC85C79B-C522-F560-697C-69999FCA7922}"/>
+              </a:ext>
+            </a:extLst>
+          </p:cNvPr>
+          <p:cNvPicPr>
+            <a:picLocks noChangeAspect="1"/>
+          </p:cNvPicPr>
+          <p:nvPr/>
+        </p:nvPicPr>
+        <p:blipFill>
+          <a:blip r:embed="rId4"/>
+          <a:stretch>
+            <a:fillRect/>
+          </a:stretch>
+        </p:blipFill>
+        <p:spPr>
+          <a:xfrm>
+            <a:off x="6269394" y="112475"/>
+            <a:ext cx="5922605" cy="4706661"/>
+          </a:xfrm>
+          <a:prstGeom prst="rect">
+            <a:avLst/>
+          </a:prstGeom>
+          <a:ln>
+            <a:noFill/>
+          </a:ln>
+          <a:effectLst>
+            <a:outerShdw blurRad="292100" dist="139700" dir="2700000" algn="tl" rotWithShape="0">
+              <a:srgbClr val="333333">
+                <a:alpha val="65000"/>
+              </a:srgbClr>
+            </a:outerShdw>
+          </a:effectLst>
+        </p:spPr>
+      </p:pic>
+    </p:spTree>
+    <p:extLst>
+      <p:ext uri="{BB962C8B-B14F-4D97-AF65-F5344CB8AC3E}">
+        <p14:creationId xmlns:p14="http://schemas.microsoft.com/office/powerpoint/2010/main" val="1198798211"/>
+      </p:ext>
+    </p:extLst>
+  </p:cSld>
+  <p:clrMapOvr>
+    <a:masterClrMapping/>
+  </p:clrMapOvr>
+</p:sld>
+</file>
+
+<file path=ppt/slides/slide18.xml><?xml version="1.0" encoding="utf-8"?>
+<p:sld xmlns:a="http://schemas.openxmlformats.org/drawingml/2006/main" xmlns:r="http://schemas.openxmlformats.org/officeDocument/2006/relationships" xmlns:p="http://schemas.openxmlformats.org/presentationml/2006/main">
+  <p:cSld>
+    <p:spTree>
+      <p:nvGrpSpPr>
+        <p:cNvPr id="1" name="">
+          <a:extLst>
+            <a:ext uri="{FF2B5EF4-FFF2-40B4-BE49-F238E27FC236}">
+              <a16:creationId xmlns:a16="http://schemas.microsoft.com/office/drawing/2014/main" id="{C1784DB7-67E0-CEB6-70BB-2455B78C9B83}"/>
+            </a:ext>
+          </a:extLst>
+        </p:cNvPr>
+        <p:cNvGrpSpPr/>
+        <p:nvPr/>
+      </p:nvGrpSpPr>
+      <p:grpSpPr>
+        <a:xfrm>
+          <a:off x="0" y="0"/>
+          <a:ext cx="0" cy="0"/>
+          <a:chOff x="0" y="0"/>
+          <a:chExt cx="0" cy="0"/>
+        </a:xfrm>
+      </p:grpSpPr>
+    </p:spTree>
+    <p:extLst>
+      <p:ext uri="{BB962C8B-B14F-4D97-AF65-F5344CB8AC3E}">
+        <p14:creationId xmlns:p14="http://schemas.microsoft.com/office/powerpoint/2010/main" val="2251855208"/>
+      </p:ext>
+    </p:extLst>
+  </p:cSld>
+  <p:clrMapOvr>
+    <a:masterClrMapping/>
+  </p:clrMapOvr>
+</p:sld>
+</file>
+
+<file path=ppt/slides/slide19.xml><?xml version="1.0" encoding="utf-8"?>
+<p:sld xmlns:a="http://schemas.openxmlformats.org/drawingml/2006/main" xmlns:r="http://schemas.openxmlformats.org/officeDocument/2006/relationships" xmlns:p="http://schemas.openxmlformats.org/presentationml/2006/main">
+  <p:cSld>
+    <p:spTree>
+      <p:nvGrpSpPr>
+        <p:cNvPr id="1" name="">
+          <a:extLst>
+            <a:ext uri="{FF2B5EF4-FFF2-40B4-BE49-F238E27FC236}">
+              <a16:creationId xmlns:a16="http://schemas.microsoft.com/office/drawing/2014/main" id="{BEC3071B-BE64-1FFE-935B-208D1FC165E3}"/>
+            </a:ext>
+          </a:extLst>
+        </p:cNvPr>
+        <p:cNvGrpSpPr/>
+        <p:nvPr/>
+      </p:nvGrpSpPr>
+      <p:grpSpPr>
+        <a:xfrm>
+          <a:off x="0" y="0"/>
+          <a:ext cx="0" cy="0"/>
+          <a:chOff x="0" y="0"/>
+          <a:chExt cx="0" cy="0"/>
+        </a:xfrm>
+      </p:grpSpPr>
+    </p:spTree>
+    <p:extLst>
+      <p:ext uri="{BB962C8B-B14F-4D97-AF65-F5344CB8AC3E}">
+        <p14:creationId xmlns:p14="http://schemas.microsoft.com/office/powerpoint/2010/main" val="3873033592"/>
       </p:ext>
     </p:extLst>
   </p:cSld>

</xml_diff>